<commit_message>
move slide to parent directory
</commit_message>
<xml_diff>
--- a/math_project_slide.pptx
+++ b/math_project_slide.pptx
@@ -8372,8 +8372,8 @@
               <a:t>Sefa </a:t>
             </a:r>
             <a:r>
-              <a:rPr lang="en-US" dirty="0" err="1"/>
-              <a:t>Büyükdikmen</a:t>
+              <a:rPr lang="en-US"/>
+              <a:t>Böyükdikmen</a:t>
             </a:r>
             <a:r>
               <a:rPr lang="en-US" dirty="0"/>

</xml_diff>